<commit_message>
Add Task 15 Solution
</commit_message>
<xml_diff>
--- a/Notes/backend_population.pptx
+++ b/Notes/backend_population.pptx
@@ -2805,7 +2805,7 @@
         <p:spPr>
           <a:xfrm>
             <a:off x="609480" y="1604520"/>
-            <a:ext cx="10972440" cy="3977280"/>
+            <a:ext cx="10972080" cy="3976920"/>
           </a:xfrm>
           <a:prstGeom prst="rect">
             <a:avLst/>
@@ -2828,12 +2828,12 @@
               <a:buChar char=""/>
             </a:pPr>
             <a:r>
-              <a:rPr b="0" lang="en-GB" sz="3200" spc="-1" strike="noStrike">
+              <a:rPr b="0" lang="en-GB" sz="1800" spc="-1" strike="noStrike">
                 <a:latin typeface="Arial"/>
               </a:rPr>
               <a:t>Click to edit the outline text format</a:t>
             </a:r>
-            <a:endParaRPr b="0" lang="en-GB" sz="3200" spc="-1" strike="noStrike">
+            <a:endParaRPr b="0" lang="en-GB" sz="1800" spc="-1" strike="noStrike">
               <a:latin typeface="Arial"/>
             </a:endParaRPr>
           </a:p>
@@ -2850,12 +2850,12 @@
               <a:buChar char=""/>
             </a:pPr>
             <a:r>
-              <a:rPr b="0" lang="en-GB" sz="2800" spc="-1" strike="noStrike">
+              <a:rPr b="0" lang="en-GB" sz="1800" spc="-1" strike="noStrike">
                 <a:latin typeface="Arial"/>
               </a:rPr>
               <a:t>Second Outline Level</a:t>
             </a:r>
-            <a:endParaRPr b="0" lang="en-GB" sz="2800" spc="-1" strike="noStrike">
+            <a:endParaRPr b="0" lang="en-GB" sz="1800" spc="-1" strike="noStrike">
               <a:latin typeface="Arial"/>
             </a:endParaRPr>
           </a:p>
@@ -2872,12 +2872,12 @@
               <a:buChar char=""/>
             </a:pPr>
             <a:r>
-              <a:rPr b="0" lang="en-GB" sz="2400" spc="-1" strike="noStrike">
+              <a:rPr b="0" lang="en-GB" sz="1800" spc="-1" strike="noStrike">
                 <a:latin typeface="Arial"/>
               </a:rPr>
               <a:t>Third Outline Level</a:t>
             </a:r>
-            <a:endParaRPr b="0" lang="en-GB" sz="2400" spc="-1" strike="noStrike">
+            <a:endParaRPr b="0" lang="en-GB" sz="1800" spc="-1" strike="noStrike">
               <a:latin typeface="Arial"/>
             </a:endParaRPr>
           </a:p>
@@ -2894,12 +2894,12 @@
               <a:buChar char=""/>
             </a:pPr>
             <a:r>
-              <a:rPr b="0" lang="en-GB" sz="2000" spc="-1" strike="noStrike">
+              <a:rPr b="0" lang="en-GB" sz="1800" spc="-1" strike="noStrike">
                 <a:latin typeface="Arial"/>
               </a:rPr>
               <a:t>Fourth Outline Level</a:t>
             </a:r>
-            <a:endParaRPr b="0" lang="en-GB" sz="2000" spc="-1" strike="noStrike">
+            <a:endParaRPr b="0" lang="en-GB" sz="1800" spc="-1" strike="noStrike">
               <a:latin typeface="Arial"/>
             </a:endParaRPr>
           </a:p>
@@ -2916,12 +2916,12 @@
               <a:buChar char=""/>
             </a:pPr>
             <a:r>
-              <a:rPr b="0" lang="en-GB" sz="2000" spc="-1" strike="noStrike">
+              <a:rPr b="0" lang="en-GB" sz="1800" spc="-1" strike="noStrike">
                 <a:latin typeface="Arial"/>
               </a:rPr>
               <a:t>Fifth Outline Level</a:t>
             </a:r>
-            <a:endParaRPr b="0" lang="en-GB" sz="2000" spc="-1" strike="noStrike">
+            <a:endParaRPr b="0" lang="en-GB" sz="1800" spc="-1" strike="noStrike">
               <a:latin typeface="Arial"/>
             </a:endParaRPr>
           </a:p>
@@ -2938,12 +2938,12 @@
               <a:buChar char=""/>
             </a:pPr>
             <a:r>
-              <a:rPr b="0" lang="en-GB" sz="2000" spc="-1" strike="noStrike">
+              <a:rPr b="0" lang="en-GB" sz="1800" spc="-1" strike="noStrike">
                 <a:latin typeface="Arial"/>
               </a:rPr>
               <a:t>Sixth Outline Level</a:t>
             </a:r>
-            <a:endParaRPr b="0" lang="en-GB" sz="2000" spc="-1" strike="noStrike">
+            <a:endParaRPr b="0" lang="en-GB" sz="1800" spc="-1" strike="noStrike">
               <a:latin typeface="Arial"/>
             </a:endParaRPr>
           </a:p>
@@ -2960,12 +2960,12 @@
               <a:buChar char=""/>
             </a:pPr>
             <a:r>
-              <a:rPr b="0" lang="en-GB" sz="2000" spc="-1" strike="noStrike">
+              <a:rPr b="0" lang="en-GB" sz="1800" spc="-1" strike="noStrike">
                 <a:latin typeface="Arial"/>
               </a:rPr>
               <a:t>Seventh Outline Level</a:t>
             </a:r>
-            <a:endParaRPr b="0" lang="en-GB" sz="2000" spc="-1" strike="noStrike">
+            <a:endParaRPr b="0" lang="en-GB" sz="1800" spc="-1" strike="noStrike">
               <a:latin typeface="Arial"/>
             </a:endParaRPr>
           </a:p>
@@ -3284,7 +3284,7 @@
         <p:spPr>
           <a:xfrm>
             <a:off x="0" y="0"/>
-            <a:ext cx="12179880" cy="6845760"/>
+            <a:ext cx="12179520" cy="6845400"/>
           </a:xfrm>
           <a:prstGeom prst="rect">
             <a:avLst/>
@@ -3311,8 +3311,8 @@
         </p:nvSpPr>
         <p:spPr>
           <a:xfrm rot="2700000">
-            <a:off x="82800" y="-1382400"/>
-            <a:ext cx="2412720" cy="3598920"/>
+            <a:off x="82800" y="-1382040"/>
+            <a:ext cx="2412360" cy="3598560"/>
           </a:xfrm>
           <a:custGeom>
             <a:avLst/>
@@ -3362,7 +3362,7 @@
         <p:spPr>
           <a:xfrm rot="2700000">
             <a:off x="1571040" y="-335160"/>
-            <a:ext cx="1623600" cy="1623600"/>
+            <a:ext cx="1623240" cy="1623240"/>
           </a:xfrm>
           <a:custGeom>
             <a:avLst/>
@@ -3415,7 +3415,7 @@
         <p:spPr>
           <a:xfrm rot="2700000">
             <a:off x="9627840" y="-2520"/>
-            <a:ext cx="4047120" cy="2535840"/>
+            <a:ext cx="4046760" cy="2535480"/>
           </a:xfrm>
           <a:custGeom>
             <a:avLst/>
@@ -3464,8 +3464,8 @@
         </p:nvSpPr>
         <p:spPr>
           <a:xfrm rot="2700000">
-            <a:off x="10269000" y="1456920"/>
-            <a:ext cx="1173600" cy="1173600"/>
+            <a:off x="10269000" y="1456560"/>
+            <a:ext cx="1173240" cy="1173240"/>
           </a:xfrm>
           <a:prstGeom prst="rect">
             <a:avLst/>
@@ -3494,8 +3494,8 @@
         </p:nvSpPr>
         <p:spPr>
           <a:xfrm rot="2700000">
-            <a:off x="-17280" y="5189760"/>
-            <a:ext cx="2432520" cy="2354040"/>
+            <a:off x="-16920" y="5189760"/>
+            <a:ext cx="2432160" cy="2353680"/>
           </a:xfrm>
           <a:custGeom>
             <a:avLst/>
@@ -3547,8 +3547,8 @@
         </p:nvSpPr>
         <p:spPr>
           <a:xfrm rot="2700000">
-            <a:off x="1775880" y="5430960"/>
-            <a:ext cx="916200" cy="916200"/>
+            <a:off x="1776240" y="5430600"/>
+            <a:ext cx="915840" cy="915840"/>
           </a:xfrm>
           <a:prstGeom prst="rect">
             <a:avLst/>
@@ -3578,7 +3578,7 @@
         <p:spPr>
           <a:xfrm rot="2700000">
             <a:off x="3401280" y="725400"/>
-            <a:ext cx="5376960" cy="5376960"/>
+            <a:ext cx="5376600" cy="5376600"/>
           </a:xfrm>
           <a:custGeom>
             <a:avLst/>
@@ -3631,8 +3631,8 @@
         </p:nvSpPr>
         <p:spPr>
           <a:xfrm rot="2700000">
-            <a:off x="2700000" y="24480"/>
-            <a:ext cx="6779160" cy="6779160"/>
+            <a:off x="2700000" y="24120"/>
+            <a:ext cx="6778800" cy="6778800"/>
           </a:xfrm>
           <a:custGeom>
             <a:avLst/>
@@ -3707,7 +3707,7 @@
         <p:spPr>
           <a:xfrm>
             <a:off x="4439520" y="4519080"/>
-            <a:ext cx="3300480" cy="1129680"/>
+            <a:ext cx="3300120" cy="1129320"/>
           </a:xfrm>
           <a:prstGeom prst="rect">
             <a:avLst/>
@@ -3763,8 +3763,8 @@
         </p:nvSpPr>
         <p:spPr>
           <a:xfrm rot="2700000">
-            <a:off x="9629640" y="5449320"/>
-            <a:ext cx="2219400" cy="2556720"/>
+            <a:off x="9629640" y="5448960"/>
+            <a:ext cx="2219040" cy="2556360"/>
           </a:xfrm>
           <a:custGeom>
             <a:avLst/>
@@ -3813,8 +3813,8 @@
         </p:nvSpPr>
         <p:spPr>
           <a:xfrm rot="2700000">
-            <a:off x="9725760" y="5234760"/>
-            <a:ext cx="947880" cy="947880"/>
+            <a:off x="9726120" y="5234760"/>
+            <a:ext cx="947520" cy="947520"/>
           </a:xfrm>
           <a:prstGeom prst="rect">
             <a:avLst/>
@@ -3844,7 +3844,7 @@
         <p:spPr>
           <a:xfrm>
             <a:off x="3204720" y="2353680"/>
-            <a:ext cx="5766840" cy="2134800"/>
+            <a:ext cx="5766480" cy="2134440"/>
           </a:xfrm>
           <a:prstGeom prst="rect">
             <a:avLst/>
@@ -3966,7 +3966,7 @@
         <p:spPr>
           <a:xfrm>
             <a:off x="838080" y="365040"/>
-            <a:ext cx="7509960" cy="1313280"/>
+            <a:ext cx="7509600" cy="1312920"/>
           </a:xfrm>
           <a:prstGeom prst="rect">
             <a:avLst/>
@@ -4018,7 +4018,7 @@
         <p:spPr>
           <a:xfrm>
             <a:off x="838080" y="1809720"/>
-            <a:ext cx="10503360" cy="3836880"/>
+            <a:ext cx="10503000" cy="3836520"/>
           </a:xfrm>
           <a:prstGeom prst="rect">
             <a:avLst/>
@@ -4039,7 +4039,7 @@
             <a:noAutofit/>
           </a:bodyPr>
           <a:p>
-            <a:pPr marL="216000" indent="-215640">
+            <a:pPr marL="216000" indent="-215280">
               <a:lnSpc>
                 <a:spcPct val="90000"/>
               </a:lnSpc>
@@ -4088,7 +4088,7 @@
             </a:endParaRPr>
           </a:p>
           <a:p>
-            <a:pPr marL="216000" indent="-215640">
+            <a:pPr marL="216000" indent="-215280">
               <a:lnSpc>
                 <a:spcPct val="90000"/>
               </a:lnSpc>
@@ -4138,7 +4138,7 @@
             </a:endParaRPr>
           </a:p>
           <a:p>
-            <a:pPr marL="216000" indent="-215640">
+            <a:pPr marL="216000" indent="-215280">
               <a:lnSpc>
                 <a:spcPct val="90000"/>
               </a:lnSpc>
@@ -4178,7 +4178,7 @@
             </a:endParaRPr>
           </a:p>
           <a:p>
-            <a:pPr marL="216000" indent="-215640">
+            <a:pPr marL="216000" indent="-215280">
               <a:lnSpc>
                 <a:spcPct val="90000"/>
               </a:lnSpc>
@@ -4268,7 +4268,7 @@
         <p:spPr>
           <a:xfrm>
             <a:off x="8352000" y="748800"/>
-            <a:ext cx="3211920" cy="709560"/>
+            <a:ext cx="3211560" cy="709200"/>
           </a:xfrm>
           <a:prstGeom prst="rect">
             <a:avLst/>
@@ -4291,7 +4291,7 @@
         <p:spPr>
           <a:xfrm>
             <a:off x="3712680" y="5023440"/>
-            <a:ext cx="4857120" cy="1466280"/>
+            <a:ext cx="4856760" cy="1465920"/>
           </a:xfrm>
           <a:prstGeom prst="rect">
             <a:avLst/>
@@ -4340,7 +4340,7 @@
         <p:spPr>
           <a:xfrm>
             <a:off x="838080" y="365040"/>
-            <a:ext cx="7509960" cy="1313280"/>
+            <a:ext cx="7509600" cy="1312920"/>
           </a:xfrm>
           <a:prstGeom prst="rect">
             <a:avLst/>
@@ -4392,7 +4392,7 @@
         <p:spPr>
           <a:xfrm>
             <a:off x="838080" y="1845720"/>
-            <a:ext cx="10503360" cy="3836880"/>
+            <a:ext cx="10503000" cy="3836520"/>
           </a:xfrm>
           <a:prstGeom prst="rect">
             <a:avLst/>
@@ -4447,7 +4447,7 @@
             </a:endParaRPr>
           </a:p>
           <a:p>
-            <a:pPr marL="228600" indent="-216360">
+            <a:pPr marL="228600" indent="-216000">
               <a:lnSpc>
                 <a:spcPct val="90000"/>
               </a:lnSpc>
@@ -4486,7 +4486,7 @@
             </a:endParaRPr>
           </a:p>
           <a:p>
-            <a:pPr lvl="1" marL="432000" indent="-215640">
+            <a:pPr lvl="1" marL="432000" indent="-215280">
               <a:lnSpc>
                 <a:spcPct val="90000"/>
               </a:lnSpc>
@@ -4567,7 +4567,7 @@
             </a:endParaRPr>
           </a:p>
           <a:p>
-            <a:pPr lvl="1" marL="432000" indent="-215640">
+            <a:pPr lvl="1" marL="432000" indent="-215280">
               <a:lnSpc>
                 <a:spcPct val="90000"/>
               </a:lnSpc>
@@ -4651,7 +4651,7 @@
         <p:spPr>
           <a:xfrm>
             <a:off x="8352000" y="748800"/>
-            <a:ext cx="3211920" cy="709560"/>
+            <a:ext cx="3211560" cy="709200"/>
           </a:xfrm>
           <a:prstGeom prst="rect">
             <a:avLst/>
@@ -4674,7 +4674,7 @@
         <p:spPr>
           <a:xfrm>
             <a:off x="4227120" y="3944880"/>
-            <a:ext cx="3828240" cy="1247040"/>
+            <a:ext cx="3827880" cy="1246680"/>
           </a:xfrm>
           <a:prstGeom prst="rect">
             <a:avLst/>
@@ -4723,7 +4723,7 @@
         <p:spPr>
           <a:xfrm>
             <a:off x="838080" y="365040"/>
-            <a:ext cx="7509960" cy="1313280"/>
+            <a:ext cx="7509600" cy="1312920"/>
           </a:xfrm>
           <a:prstGeom prst="rect">
             <a:avLst/>
@@ -4775,7 +4775,7 @@
         <p:spPr>
           <a:xfrm>
             <a:off x="838080" y="1944000"/>
-            <a:ext cx="10503360" cy="3594600"/>
+            <a:ext cx="10503000" cy="3594240"/>
           </a:xfrm>
           <a:prstGeom prst="rect">
             <a:avLst/>
@@ -4820,7 +4820,7 @@
             </a:endParaRPr>
           </a:p>
           <a:p>
-            <a:pPr marL="216000" indent="-215640">
+            <a:pPr marL="216000" indent="-215280">
               <a:lnSpc>
                 <a:spcPct val="90000"/>
               </a:lnSpc>
@@ -4860,7 +4860,7 @@
             </a:endParaRPr>
           </a:p>
           <a:p>
-            <a:pPr lvl="1" marL="432000" indent="-215640">
+            <a:pPr lvl="1" marL="432000" indent="-215280">
               <a:lnSpc>
                 <a:spcPct val="90000"/>
               </a:lnSpc>
@@ -4982,7 +4982,7 @@
             </a:endParaRPr>
           </a:p>
           <a:p>
-            <a:pPr lvl="1" marL="432000" indent="-215640">
+            <a:pPr lvl="1" marL="432000" indent="-215280">
               <a:lnSpc>
                 <a:spcPct val="90000"/>
               </a:lnSpc>
@@ -5086,7 +5086,7 @@
         <p:spPr>
           <a:xfrm>
             <a:off x="8352000" y="748800"/>
-            <a:ext cx="3211920" cy="709560"/>
+            <a:ext cx="3211560" cy="709200"/>
           </a:xfrm>
           <a:prstGeom prst="rect">
             <a:avLst/>
@@ -5109,7 +5109,7 @@
         <p:spPr>
           <a:xfrm>
             <a:off x="3903480" y="3931200"/>
-            <a:ext cx="4475880" cy="1418400"/>
+            <a:ext cx="4475520" cy="1418040"/>
           </a:xfrm>
           <a:prstGeom prst="rect">
             <a:avLst/>
@@ -5158,7 +5158,7 @@
         <p:spPr>
           <a:xfrm>
             <a:off x="838080" y="365040"/>
-            <a:ext cx="7509960" cy="1313280"/>
+            <a:ext cx="7509600" cy="1312920"/>
           </a:xfrm>
           <a:prstGeom prst="rect">
             <a:avLst/>
@@ -5210,7 +5210,7 @@
         <p:spPr>
           <a:xfrm>
             <a:off x="838080" y="2052000"/>
-            <a:ext cx="10503360" cy="3594600"/>
+            <a:ext cx="10503000" cy="3594240"/>
           </a:xfrm>
           <a:prstGeom prst="rect">
             <a:avLst/>
@@ -5255,7 +5255,7 @@
             </a:endParaRPr>
           </a:p>
           <a:p>
-            <a:pPr marL="216000" indent="-215640">
+            <a:pPr marL="216000" indent="-215280">
               <a:lnSpc>
                 <a:spcPct val="90000"/>
               </a:lnSpc>
@@ -5325,7 +5325,7 @@
             </a:endParaRPr>
           </a:p>
           <a:p>
-            <a:pPr marL="216000" indent="-215640">
+            <a:pPr marL="216000" indent="-215280">
               <a:lnSpc>
                 <a:spcPct val="90000"/>
               </a:lnSpc>
@@ -5375,7 +5375,7 @@
             </a:endParaRPr>
           </a:p>
           <a:p>
-            <a:pPr marL="216000" indent="-215640">
+            <a:pPr marL="216000" indent="-215280">
               <a:lnSpc>
                 <a:spcPct val="90000"/>
               </a:lnSpc>
@@ -5469,7 +5469,7 @@
         <p:spPr>
           <a:xfrm>
             <a:off x="8352000" y="748800"/>
-            <a:ext cx="3211920" cy="709560"/>
+            <a:ext cx="3211560" cy="709200"/>
           </a:xfrm>
           <a:prstGeom prst="rect">
             <a:avLst/>
@@ -5492,7 +5492,7 @@
         <p:spPr>
           <a:xfrm>
             <a:off x="3576600" y="4572000"/>
-            <a:ext cx="5071320" cy="1816920"/>
+            <a:ext cx="5070960" cy="1816560"/>
           </a:xfrm>
           <a:prstGeom prst="rect">
             <a:avLst/>
@@ -5541,7 +5541,7 @@
         <p:spPr>
           <a:xfrm>
             <a:off x="838080" y="365040"/>
-            <a:ext cx="7509960" cy="1313280"/>
+            <a:ext cx="7509600" cy="1312920"/>
           </a:xfrm>
           <a:prstGeom prst="rect">
             <a:avLst/>
@@ -5576,7 +5576,7 @@
                 <a:latin typeface="Calibri Light"/>
                 <a:ea typeface="DejaVu Sans"/>
               </a:rPr>
-              <a:t>Why create a relationship between users and albums?</a:t>
+              <a:t>Creating a relationship</a:t>
             </a:r>
             <a:endParaRPr b="0" lang="en-GB" sz="3600" spc="-1" strike="noStrike">
               <a:latin typeface="Arial"/>
@@ -5593,7 +5593,7 @@
         <p:spPr>
           <a:xfrm>
             <a:off x="838080" y="1413720"/>
-            <a:ext cx="10503360" cy="3836880"/>
+            <a:ext cx="10503000" cy="3836520"/>
           </a:xfrm>
           <a:prstGeom prst="rect">
             <a:avLst/>
@@ -5661,7 +5661,7 @@
             </a:endParaRPr>
           </a:p>
           <a:p>
-            <a:pPr marL="228600" indent="-216360">
+            <a:pPr marL="228600" indent="-216000">
               <a:lnSpc>
                 <a:spcPct val="90000"/>
               </a:lnSpc>
@@ -5783,7 +5783,7 @@
             </a:endParaRPr>
           </a:p>
           <a:p>
-            <a:pPr marL="228600" indent="-216360">
+            <a:pPr marL="228600" indent="-216000">
               <a:lnSpc>
                 <a:spcPct val="90000"/>
               </a:lnSpc>
@@ -5866,7 +5866,7 @@
         <p:spPr>
           <a:xfrm>
             <a:off x="8352000" y="748800"/>
-            <a:ext cx="3211920" cy="709560"/>
+            <a:ext cx="3211560" cy="709200"/>
           </a:xfrm>
           <a:prstGeom prst="rect">
             <a:avLst/>
@@ -5889,7 +5889,7 @@
         <p:spPr>
           <a:xfrm>
             <a:off x="2691720" y="3860280"/>
-            <a:ext cx="6891480" cy="1251360"/>
+            <a:ext cx="6891120" cy="1251000"/>
           </a:xfrm>
           <a:prstGeom prst="rect">
             <a:avLst/>
@@ -5938,7 +5938,7 @@
         <p:spPr>
           <a:xfrm>
             <a:off x="838080" y="365040"/>
-            <a:ext cx="7509960" cy="1313280"/>
+            <a:ext cx="7509600" cy="1312920"/>
           </a:xfrm>
           <a:prstGeom prst="rect">
             <a:avLst/>
@@ -5973,7 +5973,7 @@
                 <a:latin typeface="Calibri Light"/>
                 <a:ea typeface="DejaVu Sans"/>
               </a:rPr>
-              <a:t>Why create a relationship between users and albums?</a:t>
+              <a:t>Creating a relationship</a:t>
             </a:r>
             <a:endParaRPr b="0" lang="en-GB" sz="3600" spc="-1" strike="noStrike">
               <a:latin typeface="Arial"/>
@@ -5990,7 +5990,7 @@
         <p:spPr>
           <a:xfrm>
             <a:off x="838080" y="1449720"/>
-            <a:ext cx="10503360" cy="3836880"/>
+            <a:ext cx="10503000" cy="3836520"/>
           </a:xfrm>
           <a:prstGeom prst="rect">
             <a:avLst/>
@@ -6024,7 +6024,7 @@
             </a:endParaRPr>
           </a:p>
           <a:p>
-            <a:pPr marL="228600" indent="-216360">
+            <a:pPr marL="228600" indent="-216000">
               <a:lnSpc>
                 <a:spcPct val="90000"/>
               </a:lnSpc>
@@ -6052,7 +6052,7 @@
             </a:endParaRPr>
           </a:p>
           <a:p>
-            <a:pPr marL="228600" indent="-216360">
+            <a:pPr marL="228600" indent="-216000">
               <a:lnSpc>
                 <a:spcPct val="90000"/>
               </a:lnSpc>
@@ -6121,7 +6121,7 @@
             </a:endParaRPr>
           </a:p>
           <a:p>
-            <a:pPr marL="228600" indent="-216360">
+            <a:pPr marL="228600" indent="-216000">
               <a:lnSpc>
                 <a:spcPct val="90000"/>
               </a:lnSpc>
@@ -6169,7 +6169,7 @@
             </a:endParaRPr>
           </a:p>
           <a:p>
-            <a:pPr lvl="1" marL="432000" indent="-214920">
+            <a:pPr lvl="1" marL="432000" indent="-214560">
               <a:lnSpc>
                 <a:spcPct val="90000"/>
               </a:lnSpc>
@@ -6306,7 +6306,7 @@
         <p:spPr>
           <a:xfrm>
             <a:off x="8352000" y="748800"/>
-            <a:ext cx="3211920" cy="709560"/>
+            <a:ext cx="3211560" cy="709200"/>
           </a:xfrm>
           <a:prstGeom prst="rect">
             <a:avLst/>
@@ -6329,7 +6329,7 @@
         <p:spPr>
           <a:xfrm>
             <a:off x="1083240" y="5837400"/>
-            <a:ext cx="10076400" cy="458640"/>
+            <a:ext cx="10076040" cy="458280"/>
           </a:xfrm>
           <a:prstGeom prst="rect">
             <a:avLst/>
@@ -6378,7 +6378,7 @@
         <p:spPr>
           <a:xfrm>
             <a:off x="838080" y="365040"/>
-            <a:ext cx="7509960" cy="1313280"/>
+            <a:ext cx="7509600" cy="1312920"/>
           </a:xfrm>
           <a:prstGeom prst="rect">
             <a:avLst/>
@@ -6413,7 +6413,7 @@
                 <a:latin typeface="Calibri Light"/>
                 <a:ea typeface="DejaVu Sans"/>
               </a:rPr>
-              <a:t>Why create a relationship between users and albums?</a:t>
+              <a:t>Population</a:t>
             </a:r>
             <a:endParaRPr b="0" lang="en-GB" sz="3600" spc="-1" strike="noStrike">
               <a:latin typeface="Arial"/>
@@ -6430,7 +6430,7 @@
         <p:spPr>
           <a:xfrm>
             <a:off x="838080" y="1305720"/>
-            <a:ext cx="10503360" cy="3836880"/>
+            <a:ext cx="10503000" cy="3836520"/>
           </a:xfrm>
           <a:prstGeom prst="rect">
             <a:avLst/>
@@ -6464,7 +6464,7 @@
             </a:endParaRPr>
           </a:p>
           <a:p>
-            <a:pPr marL="228600" indent="-216360">
+            <a:pPr marL="228600" indent="-216000">
               <a:lnSpc>
                 <a:spcPct val="90000"/>
               </a:lnSpc>
@@ -6523,7 +6523,7 @@
             </a:endParaRPr>
           </a:p>
           <a:p>
-            <a:pPr marL="228600" indent="-216360">
+            <a:pPr marL="228600" indent="-216000">
               <a:lnSpc>
                 <a:spcPct val="90000"/>
               </a:lnSpc>
@@ -6623,7 +6623,7 @@
             </a:endParaRPr>
           </a:p>
           <a:p>
-            <a:pPr marL="228600" indent="-216360">
+            <a:pPr marL="228600" indent="-216000">
               <a:lnSpc>
                 <a:spcPct val="90000"/>
               </a:lnSpc>
@@ -6755,7 +6755,7 @@
             </a:endParaRPr>
           </a:p>
           <a:p>
-            <a:pPr marL="228600" indent="-216360">
+            <a:pPr marL="228600" indent="-216000">
               <a:lnSpc>
                 <a:spcPct val="90000"/>
               </a:lnSpc>
@@ -6813,7 +6813,7 @@
             </a:endParaRPr>
           </a:p>
           <a:p>
-            <a:pPr marL="228600" indent="-216360">
+            <a:pPr marL="228600" indent="-216000">
               <a:lnSpc>
                 <a:spcPct val="90000"/>
               </a:lnSpc>
@@ -6855,7 +6855,7 @@
         <p:spPr>
           <a:xfrm>
             <a:off x="8352000" y="748800"/>
-            <a:ext cx="3211920" cy="709560"/>
+            <a:ext cx="3211560" cy="709200"/>
           </a:xfrm>
           <a:prstGeom prst="rect">
             <a:avLst/>

</xml_diff>